<commit_message>
Little push ajust playlist vue
</commit_message>
<xml_diff>
--- a/src/OmegaWebApp/omega_front/src/assets/Recette.pptx
+++ b/src/OmegaWebApp/omega_front/src/assets/Recette.pptx
@@ -255,7 +255,7 @@
           <a:p>
             <a:fld id="{ACB354E7-D74F-42EB-8E6C-818B17BA4FA4}" type="datetimeFigureOut">
               <a:rPr lang="fr-FR" smtClean="0"/>
-              <a:t>22/01/2017</a:t>
+              <a:t>23/01/2017</a:t>
             </a:fld>
             <a:endParaRPr lang="fr-FR"/>
           </a:p>
@@ -423,7 +423,7 @@
           <a:p>
             <a:fld id="{ACB354E7-D74F-42EB-8E6C-818B17BA4FA4}" type="datetimeFigureOut">
               <a:rPr lang="fr-FR" smtClean="0"/>
-              <a:t>22/01/2017</a:t>
+              <a:t>23/01/2017</a:t>
             </a:fld>
             <a:endParaRPr lang="fr-FR"/>
           </a:p>
@@ -601,7 +601,7 @@
           <a:p>
             <a:fld id="{ACB354E7-D74F-42EB-8E6C-818B17BA4FA4}" type="datetimeFigureOut">
               <a:rPr lang="fr-FR" smtClean="0"/>
-              <a:t>22/01/2017</a:t>
+              <a:t>23/01/2017</a:t>
             </a:fld>
             <a:endParaRPr lang="fr-FR"/>
           </a:p>
@@ -769,7 +769,7 @@
           <a:p>
             <a:fld id="{ACB354E7-D74F-42EB-8E6C-818B17BA4FA4}" type="datetimeFigureOut">
               <a:rPr lang="fr-FR" smtClean="0"/>
-              <a:t>22/01/2017</a:t>
+              <a:t>23/01/2017</a:t>
             </a:fld>
             <a:endParaRPr lang="fr-FR"/>
           </a:p>
@@ -1014,7 +1014,7 @@
           <a:p>
             <a:fld id="{ACB354E7-D74F-42EB-8E6C-818B17BA4FA4}" type="datetimeFigureOut">
               <a:rPr lang="fr-FR" smtClean="0"/>
-              <a:t>22/01/2017</a:t>
+              <a:t>23/01/2017</a:t>
             </a:fld>
             <a:endParaRPr lang="fr-FR"/>
           </a:p>
@@ -1243,7 +1243,7 @@
           <a:p>
             <a:fld id="{ACB354E7-D74F-42EB-8E6C-818B17BA4FA4}" type="datetimeFigureOut">
               <a:rPr lang="fr-FR" smtClean="0"/>
-              <a:t>22/01/2017</a:t>
+              <a:t>23/01/2017</a:t>
             </a:fld>
             <a:endParaRPr lang="fr-FR"/>
           </a:p>
@@ -1607,7 +1607,7 @@
           <a:p>
             <a:fld id="{ACB354E7-D74F-42EB-8E6C-818B17BA4FA4}" type="datetimeFigureOut">
               <a:rPr lang="fr-FR" smtClean="0"/>
-              <a:t>22/01/2017</a:t>
+              <a:t>23/01/2017</a:t>
             </a:fld>
             <a:endParaRPr lang="fr-FR"/>
           </a:p>
@@ -1724,7 +1724,7 @@
           <a:p>
             <a:fld id="{ACB354E7-D74F-42EB-8E6C-818B17BA4FA4}" type="datetimeFigureOut">
               <a:rPr lang="fr-FR" smtClean="0"/>
-              <a:t>22/01/2017</a:t>
+              <a:t>23/01/2017</a:t>
             </a:fld>
             <a:endParaRPr lang="fr-FR"/>
           </a:p>
@@ -1819,7 +1819,7 @@
           <a:p>
             <a:fld id="{ACB354E7-D74F-42EB-8E6C-818B17BA4FA4}" type="datetimeFigureOut">
               <a:rPr lang="fr-FR" smtClean="0"/>
-              <a:t>22/01/2017</a:t>
+              <a:t>23/01/2017</a:t>
             </a:fld>
             <a:endParaRPr lang="fr-FR"/>
           </a:p>
@@ -2094,7 +2094,7 @@
           <a:p>
             <a:fld id="{ACB354E7-D74F-42EB-8E6C-818B17BA4FA4}" type="datetimeFigureOut">
               <a:rPr lang="fr-FR" smtClean="0"/>
-              <a:t>22/01/2017</a:t>
+              <a:t>23/01/2017</a:t>
             </a:fld>
             <a:endParaRPr lang="fr-FR"/>
           </a:p>
@@ -2346,7 +2346,7 @@
           <a:p>
             <a:fld id="{ACB354E7-D74F-42EB-8E6C-818B17BA4FA4}" type="datetimeFigureOut">
               <a:rPr lang="fr-FR" smtClean="0"/>
-              <a:t>22/01/2017</a:t>
+              <a:t>23/01/2017</a:t>
             </a:fld>
             <a:endParaRPr lang="fr-FR"/>
           </a:p>
@@ -2560,7 +2560,7 @@
           <a:p>
             <a:fld id="{ACB354E7-D74F-42EB-8E6C-818B17BA4FA4}" type="datetimeFigureOut">
               <a:rPr lang="fr-FR" smtClean="0"/>
-              <a:t>22/01/2017</a:t>
+              <a:t>23/01/2017</a:t>
             </a:fld>
             <a:endParaRPr lang="fr-FR"/>
           </a:p>
@@ -9725,7 +9725,7 @@
         </p:nvSpPr>
         <p:spPr>
           <a:xfrm>
-            <a:off x="6655866" y="2243274"/>
+            <a:off x="4791044" y="2065091"/>
             <a:ext cx="1973163" cy="261610"/>
           </a:xfrm>
           <a:prstGeom prst="rect">

</xml_diff>